<commit_message>
Adding Logs Query Challenges to PPT
</commit_message>
<xml_diff>
--- a/Student/Guides/Challenges.pptx
+++ b/Student/Guides/Challenges.pptx
@@ -5,7 +5,7 @@
     <p:sldMasterId id="2147483648" r:id="rId1"/>
   </p:sldMasterIdLst>
   <p:notesMasterIdLst>
-    <p:notesMasterId r:id="rId14"/>
+    <p:notesMasterId r:id="rId16"/>
   </p:notesMasterIdLst>
   <p:sldIdLst>
     <p:sldId id="256" r:id="rId2"/>
@@ -16,10 +16,12 @@
     <p:sldId id="270" r:id="rId7"/>
     <p:sldId id="263" r:id="rId8"/>
     <p:sldId id="266" r:id="rId9"/>
-    <p:sldId id="264" r:id="rId10"/>
-    <p:sldId id="271" r:id="rId11"/>
-    <p:sldId id="269" r:id="rId12"/>
-    <p:sldId id="268" r:id="rId13"/>
+    <p:sldId id="272" r:id="rId10"/>
+    <p:sldId id="273" r:id="rId11"/>
+    <p:sldId id="264" r:id="rId12"/>
+    <p:sldId id="271" r:id="rId13"/>
+    <p:sldId id="269" r:id="rId14"/>
+    <p:sldId id="268" r:id="rId15"/>
   </p:sldIdLst>
   <p:sldSz cx="12192000" cy="6858000"/>
   <p:notesSz cx="6858000" cy="9144000"/>
@@ -600,7 +602,7 @@
           <a:p>
             <a:fld id="{53D76E38-EB4B-425D-87E0-B33791D2CD91}" type="datetimeFigureOut">
               <a:rPr lang="en-US" smtClean="0"/>
-              <a:t>1/23/2020</a:t>
+              <a:t>2/24/2020</a:t>
             </a:fld>
             <a:endParaRPr lang="en-US"/>
           </a:p>
@@ -1100,7 +1102,7 @@
           <a:p>
             <a:fld id="{D1ABA2CB-342C-46F9-95EC-88F4F68DF547}" type="slidenum">
               <a:rPr lang="en-US" smtClean="0"/>
-              <a:t>9</a:t>
+              <a:t>11</a:t>
             </a:fld>
             <a:endParaRPr lang="en-US"/>
           </a:p>
@@ -1184,7 +1186,7 @@
           <a:p>
             <a:fld id="{D1ABA2CB-342C-46F9-95EC-88F4F68DF547}" type="slidenum">
               <a:rPr lang="en-US" smtClean="0"/>
-              <a:t>10</a:t>
+              <a:t>12</a:t>
             </a:fld>
             <a:endParaRPr lang="en-US"/>
           </a:p>
@@ -1350,7 +1352,7 @@
           <a:p>
             <a:fld id="{3E3C2F32-47E1-4D90-8C64-89D7BCB0B356}" type="datetimeFigureOut">
               <a:rPr lang="en-US" smtClean="0"/>
-              <a:t>1/23/2020</a:t>
+              <a:t>2/24/2020</a:t>
             </a:fld>
             <a:endParaRPr lang="en-US"/>
           </a:p>
@@ -1548,7 +1550,7 @@
           <a:p>
             <a:fld id="{3E3C2F32-47E1-4D90-8C64-89D7BCB0B356}" type="datetimeFigureOut">
               <a:rPr lang="en-US" smtClean="0"/>
-              <a:t>1/23/2020</a:t>
+              <a:t>2/24/2020</a:t>
             </a:fld>
             <a:endParaRPr lang="en-US"/>
           </a:p>
@@ -1756,7 +1758,7 @@
           <a:p>
             <a:fld id="{3E3C2F32-47E1-4D90-8C64-89D7BCB0B356}" type="datetimeFigureOut">
               <a:rPr lang="en-US" smtClean="0"/>
-              <a:t>1/23/2020</a:t>
+              <a:t>2/24/2020</a:t>
             </a:fld>
             <a:endParaRPr lang="en-US"/>
           </a:p>
@@ -1954,7 +1956,7 @@
           <a:p>
             <a:fld id="{3E3C2F32-47E1-4D90-8C64-89D7BCB0B356}" type="datetimeFigureOut">
               <a:rPr lang="en-US" smtClean="0"/>
-              <a:t>1/23/2020</a:t>
+              <a:t>2/24/2020</a:t>
             </a:fld>
             <a:endParaRPr lang="en-US"/>
           </a:p>
@@ -2229,7 +2231,7 @@
           <a:p>
             <a:fld id="{3E3C2F32-47E1-4D90-8C64-89D7BCB0B356}" type="datetimeFigureOut">
               <a:rPr lang="en-US" smtClean="0"/>
-              <a:t>1/23/2020</a:t>
+              <a:t>2/24/2020</a:t>
             </a:fld>
             <a:endParaRPr lang="en-US"/>
           </a:p>
@@ -2494,7 +2496,7 @@
           <a:p>
             <a:fld id="{3E3C2F32-47E1-4D90-8C64-89D7BCB0B356}" type="datetimeFigureOut">
               <a:rPr lang="en-US" smtClean="0"/>
-              <a:t>1/23/2020</a:t>
+              <a:t>2/24/2020</a:t>
             </a:fld>
             <a:endParaRPr lang="en-US"/>
           </a:p>
@@ -2906,7 +2908,7 @@
           <a:p>
             <a:fld id="{3E3C2F32-47E1-4D90-8C64-89D7BCB0B356}" type="datetimeFigureOut">
               <a:rPr lang="en-US" smtClean="0"/>
-              <a:t>1/23/2020</a:t>
+              <a:t>2/24/2020</a:t>
             </a:fld>
             <a:endParaRPr lang="en-US"/>
           </a:p>
@@ -3047,7 +3049,7 @@
           <a:p>
             <a:fld id="{3E3C2F32-47E1-4D90-8C64-89D7BCB0B356}" type="datetimeFigureOut">
               <a:rPr lang="en-US" smtClean="0"/>
-              <a:t>1/23/2020</a:t>
+              <a:t>2/24/2020</a:t>
             </a:fld>
             <a:endParaRPr lang="en-US"/>
           </a:p>
@@ -3160,7 +3162,7 @@
           <a:p>
             <a:fld id="{3E3C2F32-47E1-4D90-8C64-89D7BCB0B356}" type="datetimeFigureOut">
               <a:rPr lang="en-US" smtClean="0"/>
-              <a:t>1/23/2020</a:t>
+              <a:t>2/24/2020</a:t>
             </a:fld>
             <a:endParaRPr lang="en-US"/>
           </a:p>
@@ -3471,7 +3473,7 @@
           <a:p>
             <a:fld id="{3E3C2F32-47E1-4D90-8C64-89D7BCB0B356}" type="datetimeFigureOut">
               <a:rPr lang="en-US" smtClean="0"/>
-              <a:t>1/23/2020</a:t>
+              <a:t>2/24/2020</a:t>
             </a:fld>
             <a:endParaRPr lang="en-US"/>
           </a:p>
@@ -3759,7 +3761,7 @@
           <a:p>
             <a:fld id="{3E3C2F32-47E1-4D90-8C64-89D7BCB0B356}" type="datetimeFigureOut">
               <a:rPr lang="en-US" smtClean="0"/>
-              <a:t>1/23/2020</a:t>
+              <a:t>2/24/2020</a:t>
             </a:fld>
             <a:endParaRPr lang="en-US"/>
           </a:p>
@@ -4000,7 +4002,7 @@
           <a:p>
             <a:fld id="{3E3C2F32-47E1-4D90-8C64-89D7BCB0B356}" type="datetimeFigureOut">
               <a:rPr lang="en-US" smtClean="0"/>
-              <a:t>1/23/2020</a:t>
+              <a:t>2/24/2020</a:t>
             </a:fld>
             <a:endParaRPr lang="en-US"/>
           </a:p>
@@ -4436,20 +4438,13 @@
         <p:spPr/>
         <p:txBody>
           <a:bodyPr>
-            <a:normAutofit fontScale="90000"/>
+            <a:normAutofit/>
           </a:bodyPr>
           <a:lstStyle/>
           <a:p>
             <a:r>
               <a:rPr lang="en-US" dirty="0"/>
-              <a:t>Ready </a:t>
-            </a:r>
-            <a:br>
-              <a:rPr lang="en-US" dirty="0"/>
-            </a:br>
-            <a:r>
-              <a:rPr lang="en-US" dirty="0"/>
-              <a:t>Pre-day Azure Monitoring Workshop</a:t>
+              <a:t>Azure Monitor Workshop</a:t>
             </a:r>
           </a:p>
         </p:txBody>
@@ -4475,10 +4470,7 @@
           <a:bodyPr/>
           <a:lstStyle/>
           <a:p>
-            <a:r>
-              <a:rPr lang="en-US" dirty="0"/>
-              <a:t>2020</a:t>
-            </a:r>
+            <a:endParaRPr lang="en-US" dirty="0"/>
           </a:p>
         </p:txBody>
       </p:sp>
@@ -4517,7 +4509,7 @@
           <p:cNvPr id="2" name="Title 1">
             <a:extLst>
               <a:ext uri="{FF2B5EF4-FFF2-40B4-BE49-F238E27FC236}">
-                <a16:creationId xmlns:a16="http://schemas.microsoft.com/office/drawing/2014/main" id="{C56DE4EE-F33C-4E40-9BF5-44396AF32E8A}"/>
+                <a16:creationId xmlns:a16="http://schemas.microsoft.com/office/drawing/2014/main" id="{BB1818A4-9BA4-427D-AA13-E50C5DC34C4F}"/>
               </a:ext>
             </a:extLst>
           </p:cNvPr>
@@ -4535,7 +4527,7 @@
           <a:p>
             <a:r>
               <a:rPr lang="en-US" dirty="0"/>
-              <a:t>Workbooks Challenge</a:t>
+              <a:t>Optional Logs Challenge</a:t>
             </a:r>
           </a:p>
         </p:txBody>
@@ -4545,7 +4537,7 @@
           <p:cNvPr id="3" name="Content Placeholder 2">
             <a:extLst>
               <a:ext uri="{FF2B5EF4-FFF2-40B4-BE49-F238E27FC236}">
-                <a16:creationId xmlns:a16="http://schemas.microsoft.com/office/drawing/2014/main" id="{37395271-BA9B-4F04-A7C6-B7E915683536}"/>
+                <a16:creationId xmlns:a16="http://schemas.microsoft.com/office/drawing/2014/main" id="{F2C25D79-6D43-4C89-AC8F-AE004DB554D6}"/>
               </a:ext>
             </a:extLst>
           </p:cNvPr>
@@ -4556,21 +4548,28 @@
             <p:ph idx="1"/>
           </p:nvPr>
         </p:nvSpPr>
-        <p:spPr>
-          <a:xfrm>
-            <a:off x="838200" y="1825625"/>
-            <a:ext cx="10515600" cy="4667250"/>
-          </a:xfrm>
-        </p:spPr>
-        <p:txBody>
-          <a:bodyPr>
-            <a:normAutofit fontScale="85000" lnSpcReduction="20000"/>
-          </a:bodyPr>
+        <p:spPr/>
+        <p:txBody>
+          <a:bodyPr/>
           <a:lstStyle/>
           <a:p>
             <a:r>
               <a:rPr lang="en-US" dirty="0"/>
-              <a:t>Create workbook that combines browser, web server and infrastructure performance data for your </a:t>
+              <a:t>Combine infrastructure and application logs to create a single timeseries table that includes: </a:t>
+            </a:r>
+          </a:p>
+          <a:p>
+            <a:pPr lvl="1"/>
+            <a:r>
+              <a:rPr lang="en-US" dirty="0"/>
+              <a:t>CPU usage from nodes in your AKS cluster </a:t>
+            </a:r>
+          </a:p>
+          <a:p>
+            <a:pPr lvl="1"/>
+            <a:r>
+              <a:rPr lang="en-US" dirty="0"/>
+              <a:t>Server response time of requests to your </a:t>
             </a:r>
             <a:r>
               <a:rPr lang="en-US" dirty="0" err="1"/>
@@ -4578,107 +4577,18 @@
             </a:r>
             <a:r>
               <a:rPr lang="en-US" dirty="0"/>
-              <a:t> app on the AKS cluster including:</a:t>
-            </a:r>
-          </a:p>
-          <a:p>
-            <a:pPr lvl="1"/>
-            <a:r>
-              <a:rPr lang="en-US" dirty="0"/>
-              <a:t>Web page performance as observed from the client-side browser using Page View records.</a:t>
-            </a:r>
-          </a:p>
-          <a:p>
-            <a:pPr marL="914400" lvl="2" indent="0">
-              <a:buNone/>
-            </a:pPr>
-            <a:r>
-              <a:rPr lang="en-US" dirty="0"/>
-              <a:t>Visualizations: Time Selector, Table with columns for Page Titles, Page Views with Bar underneath, Average Page Time with Thresholds and Maximum Page time with Bar underneath.</a:t>
-            </a:r>
-          </a:p>
-          <a:p>
-            <a:pPr lvl="1"/>
-            <a:r>
-              <a:rPr lang="en-US" dirty="0"/>
-              <a:t>Request failures reported by the web server using Request records.</a:t>
-            </a:r>
-          </a:p>
-          <a:p>
-            <a:pPr marL="914400" lvl="2" indent="0">
-              <a:buNone/>
-            </a:pPr>
-            <a:r>
-              <a:rPr lang="en-US" dirty="0"/>
-              <a:t>Visualization: Table with columns for Request Name, HTTP Return Code, Failure Count with Heatmap and Page Time with Heatmap.</a:t>
-            </a:r>
-          </a:p>
-          <a:p>
-            <a:pPr lvl="1"/>
-            <a:r>
-              <a:rPr lang="en-US" dirty="0"/>
-              <a:t>Server response time as observed from the server-side using Request metrics.</a:t>
-            </a:r>
-          </a:p>
-          <a:p>
-            <a:pPr marL="914400" lvl="2" indent="0">
-              <a:buNone/>
-            </a:pPr>
-            <a:r>
-              <a:rPr lang="en-US" dirty="0"/>
-              <a:t>Visualization: Line Chart of Average and Max Server Response Time.</a:t>
-            </a:r>
-          </a:p>
-          <a:p>
-            <a:pPr lvl="1"/>
-            <a:r>
-              <a:rPr lang="en-US" dirty="0"/>
-              <a:t>Infrastructure performance as observed from the nodes in the AKS cluster on which the application is deployed using Average and Maximum CPU usage metrics.</a:t>
-            </a:r>
-          </a:p>
-          <a:p>
-            <a:pPr marL="914400" lvl="2" indent="0">
-              <a:buNone/>
-            </a:pPr>
-            <a:r>
-              <a:rPr lang="en-US" dirty="0"/>
-              <a:t>Visualization: Line Chart of Average CPU usage percentage by AKS cluster node.</a:t>
-            </a:r>
-          </a:p>
-          <a:p>
-            <a:pPr lvl="1"/>
-            <a:r>
-              <a:rPr lang="en-US" dirty="0"/>
-              <a:t>Infrastructure performance from AKS nodes showing disk used percentage based on Log Analytics records.</a:t>
-            </a:r>
-          </a:p>
-          <a:p>
-            <a:pPr marL="914400" lvl="2" indent="0">
-              <a:buNone/>
-            </a:pPr>
-            <a:r>
-              <a:rPr lang="en-US" dirty="0"/>
-              <a:t>Visualization: Line Chart of Average Disk used percentage by AKS cluster node.</a:t>
-            </a:r>
-          </a:p>
-          <a:p>
-            <a:pPr marL="0" indent="0">
-              <a:buNone/>
-            </a:pPr>
-            <a:r>
-              <a:rPr lang="en-US" sz="2400" dirty="0">
-                <a:hlinkClick r:id="rId3"/>
-              </a:rPr>
-              <a:t>https://docs.microsoft.com/en-us/azure/azure-monitor/app/usage-workbooks</a:t>
-            </a:r>
-            <a:endParaRPr lang="en-US" sz="2400" dirty="0"/>
+              <a:t> app hosted on the cluster.</a:t>
+            </a:r>
+          </a:p>
+          <a:p>
+            <a:endParaRPr lang="en-US" dirty="0"/>
           </a:p>
         </p:txBody>
       </p:sp>
     </p:spTree>
     <p:extLst>
       <p:ext uri="{BB962C8B-B14F-4D97-AF65-F5344CB8AC3E}">
-        <p14:creationId xmlns:p14="http://schemas.microsoft.com/office/powerpoint/2010/main" val="4184808282"/>
+        <p14:creationId xmlns:p14="http://schemas.microsoft.com/office/powerpoint/2010/main" val="2406327123"/>
       </p:ext>
     </p:extLst>
   </p:cSld>
@@ -4707,6 +4617,336 @@
       </p:grpSpPr>
       <p:sp>
         <p:nvSpPr>
+          <p:cNvPr id="2" name="Title 1">
+            <a:extLst>
+              <a:ext uri="{FF2B5EF4-FFF2-40B4-BE49-F238E27FC236}">
+                <a16:creationId xmlns:a16="http://schemas.microsoft.com/office/drawing/2014/main" id="{9103BE6A-C3F7-45A9-AAB2-2D815440BC0A}"/>
+              </a:ext>
+            </a:extLst>
+          </p:cNvPr>
+          <p:cNvSpPr>
+            <a:spLocks noGrp="1"/>
+          </p:cNvSpPr>
+          <p:nvPr>
+            <p:ph type="title"/>
+          </p:nvPr>
+        </p:nvSpPr>
+        <p:spPr/>
+        <p:txBody>
+          <a:bodyPr/>
+          <a:lstStyle/>
+          <a:p>
+            <a:r>
+              <a:rPr lang="en-US" dirty="0"/>
+              <a:t>Dashboard &amp; Analytics Challenge</a:t>
+            </a:r>
+          </a:p>
+        </p:txBody>
+      </p:sp>
+      <p:sp>
+        <p:nvSpPr>
+          <p:cNvPr id="3" name="Content Placeholder 2">
+            <a:extLst>
+              <a:ext uri="{FF2B5EF4-FFF2-40B4-BE49-F238E27FC236}">
+                <a16:creationId xmlns:a16="http://schemas.microsoft.com/office/drawing/2014/main" id="{83B3D083-6DDC-4DF6-842F-2957BF37C439}"/>
+              </a:ext>
+            </a:extLst>
+          </p:cNvPr>
+          <p:cNvSpPr>
+            <a:spLocks noGrp="1"/>
+          </p:cNvSpPr>
+          <p:nvPr>
+            <p:ph idx="1"/>
+          </p:nvPr>
+        </p:nvSpPr>
+        <p:spPr/>
+        <p:txBody>
+          <a:bodyPr>
+            <a:normAutofit/>
+          </a:bodyPr>
+          <a:lstStyle/>
+          <a:p>
+            <a:r>
+              <a:rPr lang="en-US" dirty="0"/>
+              <a:t>Deploy Grafana using Web App for Container</a:t>
+            </a:r>
+          </a:p>
+          <a:p>
+            <a:pPr lvl="1"/>
+            <a:r>
+              <a:rPr lang="en-US" dirty="0"/>
+              <a:t>Hint: </a:t>
+            </a:r>
+            <a:r>
+              <a:rPr lang="en-US" dirty="0">
+                <a:hlinkClick r:id="rId3"/>
+              </a:rPr>
+              <a:t>http://docs.grafana.org/installation/docker/</a:t>
+            </a:r>
+            <a:endParaRPr lang="en-US" dirty="0"/>
+          </a:p>
+          <a:p>
+            <a:r>
+              <a:rPr lang="en-US" dirty="0"/>
+              <a:t>Configure the Azure Monitor Data Source for Azure Monitor, Log Analytics and Application Insights</a:t>
+            </a:r>
+          </a:p>
+          <a:p>
+            <a:r>
+              <a:rPr lang="en-US" dirty="0"/>
+              <a:t>Create a CPU Chart with a Grafana variable used to select Computer Name</a:t>
+            </a:r>
+          </a:p>
+          <a:p>
+            <a:r>
+              <a:rPr lang="en-US" dirty="0"/>
+              <a:t>Add an Annotation to your chart overlaying Computer Heartbeat</a:t>
+            </a:r>
+          </a:p>
+          <a:p>
+            <a:r>
+              <a:rPr lang="en-US" dirty="0"/>
+              <a:t>First Team to email me a screenshot with your chart wins the challenge.  Good luck!</a:t>
+            </a:r>
+          </a:p>
+          <a:p>
+            <a:pPr lvl="1"/>
+            <a:endParaRPr lang="en-US" dirty="0"/>
+          </a:p>
+          <a:p>
+            <a:pPr lvl="1"/>
+            <a:endParaRPr lang="en-US" dirty="0"/>
+          </a:p>
+          <a:p>
+            <a:endParaRPr lang="en-US" dirty="0"/>
+          </a:p>
+        </p:txBody>
+      </p:sp>
+    </p:spTree>
+    <p:extLst>
+      <p:ext uri="{BB962C8B-B14F-4D97-AF65-F5344CB8AC3E}">
+        <p14:creationId xmlns:p14="http://schemas.microsoft.com/office/powerpoint/2010/main" val="340413092"/>
+      </p:ext>
+    </p:extLst>
+  </p:cSld>
+  <p:clrMapOvr>
+    <a:masterClrMapping/>
+  </p:clrMapOvr>
+</p:sld>
+</file>
+
+<file path=ppt/slides/slide12.xml><?xml version="1.0" encoding="utf-8"?>
+<p:sld xmlns:a="http://schemas.openxmlformats.org/drawingml/2006/main" xmlns:r="http://schemas.openxmlformats.org/officeDocument/2006/relationships" xmlns:p="http://schemas.openxmlformats.org/presentationml/2006/main">
+  <p:cSld>
+    <p:spTree>
+      <p:nvGrpSpPr>
+        <p:cNvPr id="1" name=""/>
+        <p:cNvGrpSpPr/>
+        <p:nvPr/>
+      </p:nvGrpSpPr>
+      <p:grpSpPr>
+        <a:xfrm>
+          <a:off x="0" y="0"/>
+          <a:ext cx="0" cy="0"/>
+          <a:chOff x="0" y="0"/>
+          <a:chExt cx="0" cy="0"/>
+        </a:xfrm>
+      </p:grpSpPr>
+      <p:sp>
+        <p:nvSpPr>
+          <p:cNvPr id="2" name="Title 1">
+            <a:extLst>
+              <a:ext uri="{FF2B5EF4-FFF2-40B4-BE49-F238E27FC236}">
+                <a16:creationId xmlns:a16="http://schemas.microsoft.com/office/drawing/2014/main" id="{C56DE4EE-F33C-4E40-9BF5-44396AF32E8A}"/>
+              </a:ext>
+            </a:extLst>
+          </p:cNvPr>
+          <p:cNvSpPr>
+            <a:spLocks noGrp="1"/>
+          </p:cNvSpPr>
+          <p:nvPr>
+            <p:ph type="title"/>
+          </p:nvPr>
+        </p:nvSpPr>
+        <p:spPr/>
+        <p:txBody>
+          <a:bodyPr/>
+          <a:lstStyle/>
+          <a:p>
+            <a:r>
+              <a:rPr lang="en-US" dirty="0"/>
+              <a:t>Workbooks Challenge</a:t>
+            </a:r>
+          </a:p>
+        </p:txBody>
+      </p:sp>
+      <p:sp>
+        <p:nvSpPr>
+          <p:cNvPr id="3" name="Content Placeholder 2">
+            <a:extLst>
+              <a:ext uri="{FF2B5EF4-FFF2-40B4-BE49-F238E27FC236}">
+                <a16:creationId xmlns:a16="http://schemas.microsoft.com/office/drawing/2014/main" id="{37395271-BA9B-4F04-A7C6-B7E915683536}"/>
+              </a:ext>
+            </a:extLst>
+          </p:cNvPr>
+          <p:cNvSpPr>
+            <a:spLocks noGrp="1"/>
+          </p:cNvSpPr>
+          <p:nvPr>
+            <p:ph idx="1"/>
+          </p:nvPr>
+        </p:nvSpPr>
+        <p:spPr>
+          <a:xfrm>
+            <a:off x="838200" y="1825625"/>
+            <a:ext cx="10515600" cy="4667250"/>
+          </a:xfrm>
+        </p:spPr>
+        <p:txBody>
+          <a:bodyPr>
+            <a:normAutofit fontScale="85000" lnSpcReduction="20000"/>
+          </a:bodyPr>
+          <a:lstStyle/>
+          <a:p>
+            <a:r>
+              <a:rPr lang="en-US" dirty="0"/>
+              <a:t>Create workbook that combines browser, web server and infrastructure performance data for your </a:t>
+            </a:r>
+            <a:r>
+              <a:rPr lang="en-US" dirty="0" err="1"/>
+              <a:t>eshoponweb</a:t>
+            </a:r>
+            <a:r>
+              <a:rPr lang="en-US" dirty="0"/>
+              <a:t> app on the AKS cluster including:</a:t>
+            </a:r>
+          </a:p>
+          <a:p>
+            <a:pPr lvl="1"/>
+            <a:r>
+              <a:rPr lang="en-US" dirty="0"/>
+              <a:t>Web page performance as observed from the client-side browser using Page View records.</a:t>
+            </a:r>
+          </a:p>
+          <a:p>
+            <a:pPr marL="914400" lvl="2" indent="0">
+              <a:buNone/>
+            </a:pPr>
+            <a:r>
+              <a:rPr lang="en-US" dirty="0"/>
+              <a:t>Visualizations: Time Selector, Table with columns for Page Titles, Page Views with Bar underneath, Average Page Time with Thresholds and Maximum Page time with Bar underneath.</a:t>
+            </a:r>
+          </a:p>
+          <a:p>
+            <a:pPr lvl="1"/>
+            <a:r>
+              <a:rPr lang="en-US" dirty="0"/>
+              <a:t>Request failures reported by the web server using Request records.</a:t>
+            </a:r>
+          </a:p>
+          <a:p>
+            <a:pPr marL="914400" lvl="2" indent="0">
+              <a:buNone/>
+            </a:pPr>
+            <a:r>
+              <a:rPr lang="en-US" dirty="0"/>
+              <a:t>Visualization: Table with columns for Request Name, HTTP Return Code, Failure Count with Heatmap and Page Time with Heatmap.</a:t>
+            </a:r>
+          </a:p>
+          <a:p>
+            <a:pPr lvl="1"/>
+            <a:r>
+              <a:rPr lang="en-US" dirty="0"/>
+              <a:t>Server response time as observed from the server-side using Request metrics.</a:t>
+            </a:r>
+          </a:p>
+          <a:p>
+            <a:pPr marL="914400" lvl="2" indent="0">
+              <a:buNone/>
+            </a:pPr>
+            <a:r>
+              <a:rPr lang="en-US" dirty="0"/>
+              <a:t>Visualization: Line Chart of Average and Max Server Response Time.</a:t>
+            </a:r>
+          </a:p>
+          <a:p>
+            <a:pPr lvl="1"/>
+            <a:r>
+              <a:rPr lang="en-US" dirty="0"/>
+              <a:t>Infrastructure performance as observed from the nodes in the AKS cluster on which the application is deployed using Average and Maximum CPU usage metrics.</a:t>
+            </a:r>
+          </a:p>
+          <a:p>
+            <a:pPr marL="914400" lvl="2" indent="0">
+              <a:buNone/>
+            </a:pPr>
+            <a:r>
+              <a:rPr lang="en-US" dirty="0"/>
+              <a:t>Visualization: Line Chart of Average CPU usage percentage by AKS cluster node.</a:t>
+            </a:r>
+          </a:p>
+          <a:p>
+            <a:pPr lvl="1"/>
+            <a:r>
+              <a:rPr lang="en-US" dirty="0"/>
+              <a:t>Infrastructure performance from AKS nodes showing disk used percentage based on Log Analytics records.</a:t>
+            </a:r>
+          </a:p>
+          <a:p>
+            <a:pPr marL="914400" lvl="2" indent="0">
+              <a:buNone/>
+            </a:pPr>
+            <a:r>
+              <a:rPr lang="en-US" dirty="0"/>
+              <a:t>Visualization: Line Chart of Average Disk used percentage by AKS cluster node.</a:t>
+            </a:r>
+          </a:p>
+          <a:p>
+            <a:pPr marL="0" indent="0">
+              <a:buNone/>
+            </a:pPr>
+            <a:r>
+              <a:rPr lang="en-US" sz="2400" dirty="0">
+                <a:hlinkClick r:id="rId3"/>
+              </a:rPr>
+              <a:t>https://docs.microsoft.com/en-us/azure/azure-monitor/app/usage-workbooks</a:t>
+            </a:r>
+            <a:endParaRPr lang="en-US" sz="2400" dirty="0"/>
+          </a:p>
+        </p:txBody>
+      </p:sp>
+    </p:spTree>
+    <p:extLst>
+      <p:ext uri="{BB962C8B-B14F-4D97-AF65-F5344CB8AC3E}">
+        <p14:creationId xmlns:p14="http://schemas.microsoft.com/office/powerpoint/2010/main" val="4184808282"/>
+      </p:ext>
+    </p:extLst>
+  </p:cSld>
+  <p:clrMapOvr>
+    <a:masterClrMapping/>
+  </p:clrMapOvr>
+</p:sld>
+</file>
+
+<file path=ppt/slides/slide13.xml><?xml version="1.0" encoding="utf-8"?>
+<p:sld xmlns:a="http://schemas.openxmlformats.org/drawingml/2006/main" xmlns:r="http://schemas.openxmlformats.org/officeDocument/2006/relationships" xmlns:p="http://schemas.openxmlformats.org/presentationml/2006/main">
+  <p:cSld>
+    <p:spTree>
+      <p:nvGrpSpPr>
+        <p:cNvPr id="1" name=""/>
+        <p:cNvGrpSpPr/>
+        <p:nvPr/>
+      </p:nvGrpSpPr>
+      <p:grpSpPr>
+        <a:xfrm>
+          <a:off x="0" y="0"/>
+          <a:ext cx="0" cy="0"/>
+          <a:chOff x="0" y="0"/>
+          <a:chExt cx="0" cy="0"/>
+        </a:xfrm>
+      </p:grpSpPr>
+      <p:sp>
+        <p:nvSpPr>
           <p:cNvPr id="4" name="Title 3">
             <a:extLst>
               <a:ext uri="{FF2B5EF4-FFF2-40B4-BE49-F238E27FC236}">
@@ -4771,7 +5011,7 @@
 </p:sld>
 </file>
 
-<file path=ppt/slides/slide12.xml><?xml version="1.0" encoding="utf-8"?>
+<file path=ppt/slides/slide14.xml><?xml version="1.0" encoding="utf-8"?>
 <p:sld xmlns:a="http://schemas.openxmlformats.org/drawingml/2006/main" xmlns:r="http://schemas.openxmlformats.org/officeDocument/2006/relationships" xmlns:p="http://schemas.openxmlformats.org/presentationml/2006/main">
   <p:cSld>
     <p:bg>
@@ -5205,16 +5445,13 @@
           <a:p>
             <a:r>
               <a:rPr lang="en-US" dirty="0"/>
-              <a:t>3:15 – 5 PM: Azure Monitor Dashboard and Analytics Challenge</a:t>
-            </a:r>
-          </a:p>
-          <a:p>
-            <a:pPr marL="0" indent="0">
-              <a:buNone/>
-            </a:pPr>
+              <a:t>3:15 – 4 PM: Log Analytics Query Challenge</a:t>
+            </a:r>
+          </a:p>
+          <a:p>
             <a:r>
               <a:rPr lang="en-US" dirty="0"/>
-              <a:t>Note: We are planning to provide a few side challenges as well.</a:t>
+              <a:t>4 – 5 PM Azure Monitor Dashboard and Analytics Challenge</a:t>
             </a:r>
           </a:p>
           <a:p>
@@ -5309,7 +5546,7 @@
         </p:spPr>
         <p:txBody>
           <a:bodyPr>
-            <a:normAutofit fontScale="92500"/>
+            <a:normAutofit lnSpcReduction="10000"/>
           </a:bodyPr>
           <a:lstStyle/>
           <a:p>
@@ -5396,16 +5633,6 @@
             <a:br>
               <a:rPr lang="en-US" dirty="0"/>
             </a:br>
-            <a:r>
-              <a:rPr lang="en-US" u="sng" dirty="0">
-                <a:hlinkClick r:id="rId7"/>
-              </a:rPr>
-              <a:t>https://github.com/rkuehfus/pre-ready-2019-H1/blob/master/Student/Guides/Deployment%20Setup%20Guide.docx?raw=true</a:t>
-            </a:r>
-            <a:endParaRPr lang="en-US" dirty="0"/>
-          </a:p>
-          <a:p>
-            <a:pPr lvl="1"/>
             <a:endParaRPr lang="en-US" dirty="0"/>
           </a:p>
         </p:txBody>
@@ -6559,7 +6786,7 @@
           <a:p>
             <a:r>
               <a:rPr lang="en-US" dirty="0"/>
-              <a:t>Dashboard &amp; Analytics Challenge</a:t>
+              <a:t>Log Analytics Query Challenge</a:t>
             </a:r>
           </a:p>
         </p:txBody>
@@ -6589,45 +6816,46 @@
           <a:p>
             <a:r>
               <a:rPr lang="en-US" dirty="0"/>
-              <a:t>Deploy Grafana using Web App for Container</a:t>
+              <a:t>Write a performance query that renders a time chart for the last 4 hours for both of the Web Servers and the SQL Server for the following perf metrics. Save each query to your favorites.</a:t>
             </a:r>
           </a:p>
           <a:p>
             <a:pPr lvl="1"/>
             <a:r>
               <a:rPr lang="en-US" dirty="0"/>
-              <a:t>Hint: </a:t>
-            </a:r>
-            <a:r>
-              <a:rPr lang="en-US" dirty="0">
-                <a:hlinkClick r:id="rId3"/>
-              </a:rPr>
-              <a:t>http://docs.grafana.org/installation/docker/</a:t>
-            </a:r>
-            <a:endParaRPr lang="en-US" dirty="0"/>
-          </a:p>
-          <a:p>
+              <a:t>Processor Utilization: Processor / % Processor Time</a:t>
+            </a:r>
+          </a:p>
+          <a:p>
+            <a:pPr lvl="1"/>
             <a:r>
               <a:rPr lang="en-US" dirty="0"/>
-              <a:t>Configure the Azure Monitor Data Source for Azure Monitor, Log Analytics and Application Insights</a:t>
-            </a:r>
-          </a:p>
-          <a:p>
+              <a:t>Memory Utilization: Memory / % Committed Bytes In Use</a:t>
+            </a:r>
+          </a:p>
+          <a:p>
+            <a:pPr lvl="1"/>
             <a:r>
               <a:rPr lang="en-US" dirty="0"/>
-              <a:t>Create a CPU Chart with a Grafana variable used to select Computer Name</a:t>
+              <a:t>Disk Utilization (IO): Disk Reads/sec and Disk Writes/sec</a:t>
             </a:r>
           </a:p>
           <a:p>
             <a:r>
               <a:rPr lang="en-US" dirty="0"/>
-              <a:t>Add an Annotation to your chart overlaying Computer Heartbeat</a:t>
+              <a:t>Create a heartbeat query for Web Servers and SQL Server</a:t>
             </a:r>
           </a:p>
           <a:p>
             <a:r>
               <a:rPr lang="en-US" dirty="0"/>
-              <a:t>First Team to email me a screenshot with your chart wins the challenge.  Good luck!</a:t>
+              <a:t>Write a performance query that renders a time chart for the last hour of the max percentage CPU usage of the AKS Cluster nodes</a:t>
+            </a:r>
+          </a:p>
+          <a:p>
+            <a:r>
+              <a:rPr lang="en-US" dirty="0"/>
+              <a:t>First team with a screenshots of the time charts wins the Challenge</a:t>
             </a:r>
           </a:p>
           <a:p>
@@ -6646,7 +6874,7 @@
     </p:spTree>
     <p:extLst>
       <p:ext uri="{BB962C8B-B14F-4D97-AF65-F5344CB8AC3E}">
-        <p14:creationId xmlns:p14="http://schemas.microsoft.com/office/powerpoint/2010/main" val="340413092"/>
+        <p14:creationId xmlns:p14="http://schemas.microsoft.com/office/powerpoint/2010/main" val="1022723343"/>
       </p:ext>
     </p:extLst>
   </p:cSld>

</xml_diff>

<commit_message>
Adding Optional Logs Challenge to PPT
</commit_message>
<xml_diff>
--- a/Student/Guides/Challenges.pptx
+++ b/Student/Guides/Challenges.pptx
@@ -602,7 +602,7 @@
           <a:p>
             <a:fld id="{53D76E38-EB4B-425D-87E0-B33791D2CD91}" type="datetimeFigureOut">
               <a:rPr lang="en-US" smtClean="0"/>
-              <a:t>2/24/2020</a:t>
+              <a:t>3/5/2020</a:t>
             </a:fld>
             <a:endParaRPr lang="en-US"/>
           </a:p>
@@ -1352,7 +1352,7 @@
           <a:p>
             <a:fld id="{3E3C2F32-47E1-4D90-8C64-89D7BCB0B356}" type="datetimeFigureOut">
               <a:rPr lang="en-US" smtClean="0"/>
-              <a:t>2/24/2020</a:t>
+              <a:t>3/5/2020</a:t>
             </a:fld>
             <a:endParaRPr lang="en-US"/>
           </a:p>
@@ -1550,7 +1550,7 @@
           <a:p>
             <a:fld id="{3E3C2F32-47E1-4D90-8C64-89D7BCB0B356}" type="datetimeFigureOut">
               <a:rPr lang="en-US" smtClean="0"/>
-              <a:t>2/24/2020</a:t>
+              <a:t>3/5/2020</a:t>
             </a:fld>
             <a:endParaRPr lang="en-US"/>
           </a:p>
@@ -1758,7 +1758,7 @@
           <a:p>
             <a:fld id="{3E3C2F32-47E1-4D90-8C64-89D7BCB0B356}" type="datetimeFigureOut">
               <a:rPr lang="en-US" smtClean="0"/>
-              <a:t>2/24/2020</a:t>
+              <a:t>3/5/2020</a:t>
             </a:fld>
             <a:endParaRPr lang="en-US"/>
           </a:p>
@@ -1956,7 +1956,7 @@
           <a:p>
             <a:fld id="{3E3C2F32-47E1-4D90-8C64-89D7BCB0B356}" type="datetimeFigureOut">
               <a:rPr lang="en-US" smtClean="0"/>
-              <a:t>2/24/2020</a:t>
+              <a:t>3/5/2020</a:t>
             </a:fld>
             <a:endParaRPr lang="en-US"/>
           </a:p>
@@ -2231,7 +2231,7 @@
           <a:p>
             <a:fld id="{3E3C2F32-47E1-4D90-8C64-89D7BCB0B356}" type="datetimeFigureOut">
               <a:rPr lang="en-US" smtClean="0"/>
-              <a:t>2/24/2020</a:t>
+              <a:t>3/5/2020</a:t>
             </a:fld>
             <a:endParaRPr lang="en-US"/>
           </a:p>
@@ -2496,7 +2496,7 @@
           <a:p>
             <a:fld id="{3E3C2F32-47E1-4D90-8C64-89D7BCB0B356}" type="datetimeFigureOut">
               <a:rPr lang="en-US" smtClean="0"/>
-              <a:t>2/24/2020</a:t>
+              <a:t>3/5/2020</a:t>
             </a:fld>
             <a:endParaRPr lang="en-US"/>
           </a:p>
@@ -2908,7 +2908,7 @@
           <a:p>
             <a:fld id="{3E3C2F32-47E1-4D90-8C64-89D7BCB0B356}" type="datetimeFigureOut">
               <a:rPr lang="en-US" smtClean="0"/>
-              <a:t>2/24/2020</a:t>
+              <a:t>3/5/2020</a:t>
             </a:fld>
             <a:endParaRPr lang="en-US"/>
           </a:p>
@@ -3049,7 +3049,7 @@
           <a:p>
             <a:fld id="{3E3C2F32-47E1-4D90-8C64-89D7BCB0B356}" type="datetimeFigureOut">
               <a:rPr lang="en-US" smtClean="0"/>
-              <a:t>2/24/2020</a:t>
+              <a:t>3/5/2020</a:t>
             </a:fld>
             <a:endParaRPr lang="en-US"/>
           </a:p>
@@ -3162,7 +3162,7 @@
           <a:p>
             <a:fld id="{3E3C2F32-47E1-4D90-8C64-89D7BCB0B356}" type="datetimeFigureOut">
               <a:rPr lang="en-US" smtClean="0"/>
-              <a:t>2/24/2020</a:t>
+              <a:t>3/5/2020</a:t>
             </a:fld>
             <a:endParaRPr lang="en-US"/>
           </a:p>
@@ -3473,7 +3473,7 @@
           <a:p>
             <a:fld id="{3E3C2F32-47E1-4D90-8C64-89D7BCB0B356}" type="datetimeFigureOut">
               <a:rPr lang="en-US" smtClean="0"/>
-              <a:t>2/24/2020</a:t>
+              <a:t>3/5/2020</a:t>
             </a:fld>
             <a:endParaRPr lang="en-US"/>
           </a:p>
@@ -3761,7 +3761,7 @@
           <a:p>
             <a:fld id="{3E3C2F32-47E1-4D90-8C64-89D7BCB0B356}" type="datetimeFigureOut">
               <a:rPr lang="en-US" smtClean="0"/>
-              <a:t>2/24/2020</a:t>
+              <a:t>3/5/2020</a:t>
             </a:fld>
             <a:endParaRPr lang="en-US"/>
           </a:p>
@@ -4002,7 +4002,7 @@
           <a:p>
             <a:fld id="{3E3C2F32-47E1-4D90-8C64-89D7BCB0B356}" type="datetimeFigureOut">
               <a:rPr lang="en-US" smtClean="0"/>
-              <a:t>2/24/2020</a:t>
+              <a:t>3/5/2020</a:t>
             </a:fld>
             <a:endParaRPr lang="en-US"/>
           </a:p>
@@ -4555,21 +4555,14 @@
           <a:p>
             <a:r>
               <a:rPr lang="en-US" dirty="0"/>
-              <a:t>Combine infrastructure and application logs to create a single timeseries table that includes: </a:t>
+              <a:t>Combine infrastructure and application logs to create a single timeseries chart that includes: </a:t>
             </a:r>
           </a:p>
           <a:p>
             <a:pPr lvl="1"/>
             <a:r>
               <a:rPr lang="en-US" dirty="0"/>
-              <a:t>CPU usage from nodes in your AKS cluster </a:t>
-            </a:r>
-          </a:p>
-          <a:p>
-            <a:pPr lvl="1"/>
-            <a:r>
-              <a:rPr lang="en-US" dirty="0"/>
-              <a:t>Server response time of requests to your </a:t>
+              <a:t>CPU usage from the node in your AKS cluster hosting the </a:t>
             </a:r>
             <a:r>
               <a:rPr lang="en-US" dirty="0" err="1"/>
@@ -4577,7 +4570,22 @@
             </a:r>
             <a:r>
               <a:rPr lang="en-US" dirty="0"/>
-              <a:t> app hosted on the cluster.</a:t>
+              <a:t> app</a:t>
+            </a:r>
+          </a:p>
+          <a:p>
+            <a:pPr lvl="1"/>
+            <a:r>
+              <a:rPr lang="en-US" dirty="0"/>
+              <a:t>Duration of page views on your </a:t>
+            </a:r>
+            <a:r>
+              <a:rPr lang="en-US" dirty="0" err="1"/>
+              <a:t>eshoponweb</a:t>
+            </a:r>
+            <a:r>
+              <a:rPr lang="en-US" dirty="0"/>
+              <a:t> app hosted on the cluster</a:t>
             </a:r>
           </a:p>
           <a:p>

</xml_diff>

<commit_message>
Added request for screenshots in challenges
</commit_message>
<xml_diff>
--- a/Student/Guides/Challenges.pptx
+++ b/Student/Guides/Challenges.pptx
@@ -602,7 +602,7 @@
           <a:p>
             <a:fld id="{53D76E38-EB4B-425D-87E0-B33791D2CD91}" type="datetimeFigureOut">
               <a:rPr lang="en-US" smtClean="0"/>
-              <a:t>3/23/2020</a:t>
+              <a:t>4/2/2020</a:t>
             </a:fld>
             <a:endParaRPr lang="en-US"/>
           </a:p>
@@ -1352,7 +1352,7 @@
           <a:p>
             <a:fld id="{3E3C2F32-47E1-4D90-8C64-89D7BCB0B356}" type="datetimeFigureOut">
               <a:rPr lang="en-US" smtClean="0"/>
-              <a:t>3/23/2020</a:t>
+              <a:t>4/2/2020</a:t>
             </a:fld>
             <a:endParaRPr lang="en-US"/>
           </a:p>
@@ -1550,7 +1550,7 @@
           <a:p>
             <a:fld id="{3E3C2F32-47E1-4D90-8C64-89D7BCB0B356}" type="datetimeFigureOut">
               <a:rPr lang="en-US" smtClean="0"/>
-              <a:t>3/23/2020</a:t>
+              <a:t>4/2/2020</a:t>
             </a:fld>
             <a:endParaRPr lang="en-US"/>
           </a:p>
@@ -1758,7 +1758,7 @@
           <a:p>
             <a:fld id="{3E3C2F32-47E1-4D90-8C64-89D7BCB0B356}" type="datetimeFigureOut">
               <a:rPr lang="en-US" smtClean="0"/>
-              <a:t>3/23/2020</a:t>
+              <a:t>4/2/2020</a:t>
             </a:fld>
             <a:endParaRPr lang="en-US"/>
           </a:p>
@@ -1956,7 +1956,7 @@
           <a:p>
             <a:fld id="{3E3C2F32-47E1-4D90-8C64-89D7BCB0B356}" type="datetimeFigureOut">
               <a:rPr lang="en-US" smtClean="0"/>
-              <a:t>3/23/2020</a:t>
+              <a:t>4/2/2020</a:t>
             </a:fld>
             <a:endParaRPr lang="en-US"/>
           </a:p>
@@ -2231,7 +2231,7 @@
           <a:p>
             <a:fld id="{3E3C2F32-47E1-4D90-8C64-89D7BCB0B356}" type="datetimeFigureOut">
               <a:rPr lang="en-US" smtClean="0"/>
-              <a:t>3/23/2020</a:t>
+              <a:t>4/2/2020</a:t>
             </a:fld>
             <a:endParaRPr lang="en-US"/>
           </a:p>
@@ -2496,7 +2496,7 @@
           <a:p>
             <a:fld id="{3E3C2F32-47E1-4D90-8C64-89D7BCB0B356}" type="datetimeFigureOut">
               <a:rPr lang="en-US" smtClean="0"/>
-              <a:t>3/23/2020</a:t>
+              <a:t>4/2/2020</a:t>
             </a:fld>
             <a:endParaRPr lang="en-US"/>
           </a:p>
@@ -2908,7 +2908,7 @@
           <a:p>
             <a:fld id="{3E3C2F32-47E1-4D90-8C64-89D7BCB0B356}" type="datetimeFigureOut">
               <a:rPr lang="en-US" smtClean="0"/>
-              <a:t>3/23/2020</a:t>
+              <a:t>4/2/2020</a:t>
             </a:fld>
             <a:endParaRPr lang="en-US"/>
           </a:p>
@@ -3049,7 +3049,7 @@
           <a:p>
             <a:fld id="{3E3C2F32-47E1-4D90-8C64-89D7BCB0B356}" type="datetimeFigureOut">
               <a:rPr lang="en-US" smtClean="0"/>
-              <a:t>3/23/2020</a:t>
+              <a:t>4/2/2020</a:t>
             </a:fld>
             <a:endParaRPr lang="en-US"/>
           </a:p>
@@ -3162,7 +3162,7 @@
           <a:p>
             <a:fld id="{3E3C2F32-47E1-4D90-8C64-89D7BCB0B356}" type="datetimeFigureOut">
               <a:rPr lang="en-US" smtClean="0"/>
-              <a:t>3/23/2020</a:t>
+              <a:t>4/2/2020</a:t>
             </a:fld>
             <a:endParaRPr lang="en-US"/>
           </a:p>
@@ -3473,7 +3473,7 @@
           <a:p>
             <a:fld id="{3E3C2F32-47E1-4D90-8C64-89D7BCB0B356}" type="datetimeFigureOut">
               <a:rPr lang="en-US" smtClean="0"/>
-              <a:t>3/23/2020</a:t>
+              <a:t>4/2/2020</a:t>
             </a:fld>
             <a:endParaRPr lang="en-US"/>
           </a:p>
@@ -3761,7 +3761,7 @@
           <a:p>
             <a:fld id="{3E3C2F32-47E1-4D90-8C64-89D7BCB0B356}" type="datetimeFigureOut">
               <a:rPr lang="en-US" smtClean="0"/>
-              <a:t>3/23/2020</a:t>
+              <a:t>4/2/2020</a:t>
             </a:fld>
             <a:endParaRPr lang="en-US"/>
           </a:p>
@@ -4002,7 +4002,7 @@
           <a:p>
             <a:fld id="{3E3C2F32-47E1-4D90-8C64-89D7BCB0B356}" type="datetimeFigureOut">
               <a:rPr lang="en-US" smtClean="0"/>
-              <a:t>3/23/2020</a:t>
+              <a:t>4/2/2020</a:t>
             </a:fld>
             <a:endParaRPr lang="en-US"/>
           </a:p>
@@ -4714,7 +4714,7 @@
           <a:p>
             <a:r>
               <a:rPr lang="en-US" dirty="0"/>
-              <a:t>First Team to email me a screenshot with your chart wins the challenge.  Good luck!</a:t>
+              <a:t>First Team to post a screenshot with your chart wins the challenge.  Good luck!</a:t>
             </a:r>
           </a:p>
           <a:p>
@@ -6021,12 +6021,8 @@
               <a:t>Powershell</a:t>
             </a:r>
             <a:r>
-              <a:rPr lang="en-US" sz="2000"/>
-              <a:t> or ARM </a:t>
-            </a:r>
-            <a:r>
               <a:rPr lang="en-US" sz="2000" dirty="0"/>
-              <a:t>template, send the below guest OS metric to Azure Monitor for the SQL Server</a:t>
+              <a:t> or ARM template, send the below guest OS metric to Azure Monitor for the SQL Server</a:t>
             </a:r>
           </a:p>
           <a:p>
@@ -6076,9 +6072,12 @@
               <a:rPr lang="en-US" sz="1600" dirty="0">
                 <a:hlinkClick r:id="rId3"/>
               </a:rPr>
-              <a:t>https://docs.microsoft.com/en-us/azure/monitoring-and-diagnostics/metrics-store-custom-guestos-resource-manager-vm</a:t>
-            </a:r>
-            <a:endParaRPr lang="en-US" sz="1600" dirty="0"/>
+              <a:t>https://docs.microsoft.com/en-us/azure/azure-monitor/platform/diagnostics-extension-windows-install#azure-cli-deployment</a:t>
+            </a:r>
+            <a:r>
+              <a:rPr lang="en-US" sz="1600" dirty="0"/>
+              <a:t> </a:t>
+            </a:r>
           </a:p>
           <a:p>
             <a:r>
@@ -6178,7 +6177,7 @@
           <a:p>
             <a:r>
               <a:rPr lang="en-US" sz="2000" dirty="0"/>
-              <a:t>First team to send me both alerts wins the challenge!!</a:t>
+              <a:t>First team to post screenshots of alert email notifications win the challenge.</a:t>
             </a:r>
           </a:p>
           <a:p>
@@ -6368,7 +6367,7 @@
           <a:p>
             <a:r>
               <a:rPr lang="en-US" sz="2000" dirty="0"/>
-              <a:t>First team to me a screenshot of the new Alert Rules and Action Rule wins the challenge!!</a:t>
+              <a:t>First team to post screenshot of the new Alert Rules and Action Rule wins the challenge!!</a:t>
             </a:r>
           </a:p>
           <a:p>
@@ -6587,7 +6586,7 @@
             </a:pPr>
             <a:r>
               <a:rPr lang="en-US" sz="2400" dirty="0"/>
-              <a:t>First person to send me a screen shot of the live log with the exception message wins the challenge </a:t>
+              <a:t>First person to post a screenshot of the live log with the exception message wins the challenge </a:t>
             </a:r>
           </a:p>
         </p:txBody>
@@ -6745,7 +6744,7 @@
           <a:p>
             <a:r>
               <a:rPr lang="en-US" dirty="0"/>
-              <a:t>First Team to email me an alert of the exception wins the challenge.  Good luck</a:t>
+              <a:t>First team to post screenshot with email alert of the exception wins the challenge.  Good luck</a:t>
             </a:r>
           </a:p>
           <a:p>
@@ -6875,7 +6874,7 @@
           <a:p>
             <a:r>
               <a:rPr lang="en-US" dirty="0"/>
-              <a:t>First team with a screenshots of the time charts wins the Challenge</a:t>
+              <a:t>First team with screenshots of the time charts wins the Challenge</a:t>
             </a:r>
           </a:p>
           <a:p>

</xml_diff>

<commit_message>
Updating AI and CI challenges
Switch order of AI and CI challenges to start with AI
Update AI challenge to recommend manual instrumentation
Update CI challenge to push app to AKS via Container Registry and YAML files.
</commit_message>
<xml_diff>
--- a/Student/Guides/Challenges.pptx
+++ b/Student/Guides/Challenges.pptx
@@ -14,8 +14,8 @@
     <p:sldId id="258" r:id="rId5"/>
     <p:sldId id="262" r:id="rId6"/>
     <p:sldId id="270" r:id="rId7"/>
-    <p:sldId id="263" r:id="rId8"/>
-    <p:sldId id="266" r:id="rId9"/>
+    <p:sldId id="266" r:id="rId8"/>
+    <p:sldId id="263" r:id="rId9"/>
     <p:sldId id="272" r:id="rId10"/>
     <p:sldId id="273" r:id="rId11"/>
     <p:sldId id="264" r:id="rId12"/>
@@ -602,7 +602,7 @@
           <a:p>
             <a:fld id="{53D76E38-EB4B-425D-87E0-B33791D2CD91}" type="datetimeFigureOut">
               <a:rPr lang="en-US" smtClean="0"/>
-              <a:t>4/2/2020</a:t>
+              <a:t>10/2/2020</a:t>
             </a:fld>
             <a:endParaRPr lang="en-US"/>
           </a:p>
@@ -1081,6 +1081,93 @@
           <a:bodyPr/>
           <a:lstStyle/>
           <a:p>
+            <a:r>
+              <a:rPr lang="en-US" dirty="0"/>
+              <a:t>When configuring dependencies for publishing, do not store strings and keys in local secrets, always choose None.</a:t>
+            </a:r>
+          </a:p>
+        </p:txBody>
+      </p:sp>
+      <p:sp>
+        <p:nvSpPr>
+          <p:cNvPr id="4" name="Slide Number Placeholder 3"/>
+          <p:cNvSpPr>
+            <a:spLocks noGrp="1"/>
+          </p:cNvSpPr>
+          <p:nvPr>
+            <p:ph type="sldNum" sz="quarter" idx="5"/>
+          </p:nvPr>
+        </p:nvSpPr>
+        <p:spPr/>
+        <p:txBody>
+          <a:bodyPr/>
+          <a:lstStyle/>
+          <a:p>
+            <a:fld id="{D1ABA2CB-342C-46F9-95EC-88F4F68DF547}" type="slidenum">
+              <a:rPr lang="en-US" smtClean="0"/>
+              <a:t>8</a:t>
+            </a:fld>
+            <a:endParaRPr lang="en-US"/>
+          </a:p>
+        </p:txBody>
+      </p:sp>
+    </p:spTree>
+    <p:extLst>
+      <p:ext uri="{BB962C8B-B14F-4D97-AF65-F5344CB8AC3E}">
+        <p14:creationId xmlns:p14="http://schemas.microsoft.com/office/powerpoint/2010/main" val="2617078074"/>
+      </p:ext>
+    </p:extLst>
+  </p:cSld>
+  <p:clrMapOvr>
+    <a:masterClrMapping/>
+  </p:clrMapOvr>
+</p:notes>
+</file>
+
+<file path=ppt/notesSlides/notesSlide4.xml><?xml version="1.0" encoding="utf-8"?>
+<p:notes xmlns:a="http://schemas.openxmlformats.org/drawingml/2006/main" xmlns:r="http://schemas.openxmlformats.org/officeDocument/2006/relationships" xmlns:p="http://schemas.openxmlformats.org/presentationml/2006/main">
+  <p:cSld>
+    <p:spTree>
+      <p:nvGrpSpPr>
+        <p:cNvPr id="1" name=""/>
+        <p:cNvGrpSpPr/>
+        <p:nvPr/>
+      </p:nvGrpSpPr>
+      <p:grpSpPr>
+        <a:xfrm>
+          <a:off x="0" y="0"/>
+          <a:ext cx="0" cy="0"/>
+          <a:chOff x="0" y="0"/>
+          <a:chExt cx="0" cy="0"/>
+        </a:xfrm>
+      </p:grpSpPr>
+      <p:sp>
+        <p:nvSpPr>
+          <p:cNvPr id="2" name="Slide Image Placeholder 1"/>
+          <p:cNvSpPr>
+            <a:spLocks noGrp="1" noRot="1" noChangeAspect="1"/>
+          </p:cNvSpPr>
+          <p:nvPr>
+            <p:ph type="sldImg"/>
+          </p:nvPr>
+        </p:nvSpPr>
+        <p:spPr/>
+      </p:sp>
+      <p:sp>
+        <p:nvSpPr>
+          <p:cNvPr id="3" name="Notes Placeholder 2"/>
+          <p:cNvSpPr>
+            <a:spLocks noGrp="1"/>
+          </p:cNvSpPr>
+          <p:nvPr>
+            <p:ph type="body" idx="1"/>
+          </p:nvPr>
+        </p:nvSpPr>
+        <p:spPr/>
+        <p:txBody>
+          <a:bodyPr/>
+          <a:lstStyle/>
+          <a:p>
             <a:endParaRPr lang="en-US" dirty="0"/>
           </a:p>
         </p:txBody>
@@ -1121,7 +1208,7 @@
 </p:notes>
 </file>
 
-<file path=ppt/notesSlides/notesSlide4.xml><?xml version="1.0" encoding="utf-8"?>
+<file path=ppt/notesSlides/notesSlide5.xml><?xml version="1.0" encoding="utf-8"?>
 <p:notes xmlns:a="http://schemas.openxmlformats.org/drawingml/2006/main" xmlns:r="http://schemas.openxmlformats.org/officeDocument/2006/relationships" xmlns:p="http://schemas.openxmlformats.org/presentationml/2006/main">
   <p:cSld>
     <p:spTree>
@@ -1352,7 +1439,7 @@
           <a:p>
             <a:fld id="{3E3C2F32-47E1-4D90-8C64-89D7BCB0B356}" type="datetimeFigureOut">
               <a:rPr lang="en-US" smtClean="0"/>
-              <a:t>4/2/2020</a:t>
+              <a:t>10/2/2020</a:t>
             </a:fld>
             <a:endParaRPr lang="en-US"/>
           </a:p>
@@ -1550,7 +1637,7 @@
           <a:p>
             <a:fld id="{3E3C2F32-47E1-4D90-8C64-89D7BCB0B356}" type="datetimeFigureOut">
               <a:rPr lang="en-US" smtClean="0"/>
-              <a:t>4/2/2020</a:t>
+              <a:t>10/2/2020</a:t>
             </a:fld>
             <a:endParaRPr lang="en-US"/>
           </a:p>
@@ -1758,7 +1845,7 @@
           <a:p>
             <a:fld id="{3E3C2F32-47E1-4D90-8C64-89D7BCB0B356}" type="datetimeFigureOut">
               <a:rPr lang="en-US" smtClean="0"/>
-              <a:t>4/2/2020</a:t>
+              <a:t>10/2/2020</a:t>
             </a:fld>
             <a:endParaRPr lang="en-US"/>
           </a:p>
@@ -1956,7 +2043,7 @@
           <a:p>
             <a:fld id="{3E3C2F32-47E1-4D90-8C64-89D7BCB0B356}" type="datetimeFigureOut">
               <a:rPr lang="en-US" smtClean="0"/>
-              <a:t>4/2/2020</a:t>
+              <a:t>10/2/2020</a:t>
             </a:fld>
             <a:endParaRPr lang="en-US"/>
           </a:p>
@@ -2231,7 +2318,7 @@
           <a:p>
             <a:fld id="{3E3C2F32-47E1-4D90-8C64-89D7BCB0B356}" type="datetimeFigureOut">
               <a:rPr lang="en-US" smtClean="0"/>
-              <a:t>4/2/2020</a:t>
+              <a:t>10/2/2020</a:t>
             </a:fld>
             <a:endParaRPr lang="en-US"/>
           </a:p>
@@ -2496,7 +2583,7 @@
           <a:p>
             <a:fld id="{3E3C2F32-47E1-4D90-8C64-89D7BCB0B356}" type="datetimeFigureOut">
               <a:rPr lang="en-US" smtClean="0"/>
-              <a:t>4/2/2020</a:t>
+              <a:t>10/2/2020</a:t>
             </a:fld>
             <a:endParaRPr lang="en-US"/>
           </a:p>
@@ -2908,7 +2995,7 @@
           <a:p>
             <a:fld id="{3E3C2F32-47E1-4D90-8C64-89D7BCB0B356}" type="datetimeFigureOut">
               <a:rPr lang="en-US" smtClean="0"/>
-              <a:t>4/2/2020</a:t>
+              <a:t>10/2/2020</a:t>
             </a:fld>
             <a:endParaRPr lang="en-US"/>
           </a:p>
@@ -3049,7 +3136,7 @@
           <a:p>
             <a:fld id="{3E3C2F32-47E1-4D90-8C64-89D7BCB0B356}" type="datetimeFigureOut">
               <a:rPr lang="en-US" smtClean="0"/>
-              <a:t>4/2/2020</a:t>
+              <a:t>10/2/2020</a:t>
             </a:fld>
             <a:endParaRPr lang="en-US"/>
           </a:p>
@@ -3162,7 +3249,7 @@
           <a:p>
             <a:fld id="{3E3C2F32-47E1-4D90-8C64-89D7BCB0B356}" type="datetimeFigureOut">
               <a:rPr lang="en-US" smtClean="0"/>
-              <a:t>4/2/2020</a:t>
+              <a:t>10/2/2020</a:t>
             </a:fld>
             <a:endParaRPr lang="en-US"/>
           </a:p>
@@ -3473,7 +3560,7 @@
           <a:p>
             <a:fld id="{3E3C2F32-47E1-4D90-8C64-89D7BCB0B356}" type="datetimeFigureOut">
               <a:rPr lang="en-US" smtClean="0"/>
-              <a:t>4/2/2020</a:t>
+              <a:t>10/2/2020</a:t>
             </a:fld>
             <a:endParaRPr lang="en-US"/>
           </a:p>
@@ -3761,7 +3848,7 @@
           <a:p>
             <a:fld id="{3E3C2F32-47E1-4D90-8C64-89D7BCB0B356}" type="datetimeFigureOut">
               <a:rPr lang="en-US" smtClean="0"/>
-              <a:t>4/2/2020</a:t>
+              <a:t>10/2/2020</a:t>
             </a:fld>
             <a:endParaRPr lang="en-US"/>
           </a:p>
@@ -4002,7 +4089,7 @@
           <a:p>
             <a:fld id="{3E3C2F32-47E1-4D90-8C64-89D7BCB0B356}" type="datetimeFigureOut">
               <a:rPr lang="en-US" smtClean="0"/>
-              <a:t>4/2/2020</a:t>
+              <a:t>10/2/2020</a:t>
             </a:fld>
             <a:endParaRPr lang="en-US"/>
           </a:p>
@@ -4444,7 +4531,7 @@
           <a:p>
             <a:r>
               <a:rPr lang="en-US" dirty="0"/>
-              <a:t>Azure Monitor Workshop</a:t>
+              <a:t>Azure Monitor Hackathon</a:t>
             </a:r>
           </a:p>
         </p:txBody>
@@ -4470,7 +4557,10 @@
           <a:bodyPr/>
           <a:lstStyle/>
           <a:p>
-            <a:endParaRPr lang="en-US" dirty="0"/>
+            <a:r>
+              <a:rPr lang="en-US" dirty="0"/>
+              <a:t>Challenge-based Azure Monitoring Workshop</a:t>
+            </a:r>
           </a:p>
         </p:txBody>
       </p:sp>
@@ -4577,7 +4667,7 @@
             <a:pPr lvl="1"/>
             <a:r>
               <a:rPr lang="en-US" dirty="0"/>
-              <a:t>Duration of page views on your </a:t>
+              <a:t>Duration of requests on your </a:t>
             </a:r>
             <a:r>
               <a:rPr lang="en-US" dirty="0" err="1"/>
@@ -5429,7 +5519,7 @@
           <a:p>
             <a:r>
               <a:rPr lang="en-US" dirty="0"/>
-              <a:t>10:45 - Noon: Azure Monitor for containers Challenge</a:t>
+              <a:t>10:45 - Noon: Azure Monitor Application Insights Challenge</a:t>
             </a:r>
           </a:p>
           <a:p>
@@ -5441,7 +5531,7 @@
           <a:p>
             <a:r>
               <a:rPr lang="en-US" dirty="0"/>
-              <a:t>1 – 3 PM: Azure Monitor Application Insights Challenge</a:t>
+              <a:t>1 – 3 PM: Azure Monitor for containers Challenge</a:t>
             </a:r>
           </a:p>
           <a:p>
@@ -5993,7 +6083,7 @@
             </a:r>
             <a:r>
               <a:rPr lang="en-US" sz="2000" dirty="0"/>
-              <a:t>” on the SQL Server</a:t>
+              <a:t>” on the SQL Server VM</a:t>
             </a:r>
             <a:br>
               <a:rPr lang="en-US" sz="2000" dirty="0"/>
@@ -6094,7 +6184,7 @@
             </a:r>
             <a:r>
               <a:rPr lang="en-US" sz="2000" dirty="0" err="1"/>
-              <a:t>Hammerdb</a:t>
+              <a:t>HammerDB</a:t>
             </a:r>
             <a:r>
               <a:rPr lang="en-US" sz="2000" dirty="0"/>
@@ -6413,7 +6503,7 @@
           <p:cNvPr id="2" name="Title 1">
             <a:extLst>
               <a:ext uri="{FF2B5EF4-FFF2-40B4-BE49-F238E27FC236}">
-                <a16:creationId xmlns:a16="http://schemas.microsoft.com/office/drawing/2014/main" id="{9103BE6A-C3F7-45A9-AAB2-2D815440BC0A}"/>
+                <a16:creationId xmlns:a16="http://schemas.microsoft.com/office/drawing/2014/main" id="{DF07F779-9493-43B4-B2B0-F6812A193792}"/>
               </a:ext>
             </a:extLst>
           </p:cNvPr>
@@ -6431,7 +6521,7 @@
           <a:p>
             <a:r>
               <a:rPr lang="en-US" dirty="0"/>
-              <a:t>Azure Monitor for Containers Challenge</a:t>
+              <a:t>Application Insights Challenge</a:t>
             </a:r>
           </a:p>
         </p:txBody>
@@ -6441,7 +6531,7 @@
           <p:cNvPr id="3" name="Content Placeholder 2">
             <a:extLst>
               <a:ext uri="{FF2B5EF4-FFF2-40B4-BE49-F238E27FC236}">
-                <a16:creationId xmlns:a16="http://schemas.microsoft.com/office/drawing/2014/main" id="{83B3D083-6DDC-4DF6-842F-2957BF37C439}"/>
+                <a16:creationId xmlns:a16="http://schemas.microsoft.com/office/drawing/2014/main" id="{1E78601A-55E5-4C27-BA46-67A384908580}"/>
               </a:ext>
             </a:extLst>
           </p:cNvPr>
@@ -6452,149 +6542,132 @@
             <p:ph idx="1"/>
           </p:nvPr>
         </p:nvSpPr>
-        <p:spPr>
-          <a:xfrm>
-            <a:off x="838200" y="1506071"/>
-            <a:ext cx="10515600" cy="4670892"/>
-          </a:xfrm>
-        </p:spPr>
+        <p:spPr/>
         <p:txBody>
           <a:bodyPr>
-            <a:normAutofit/>
+            <a:normAutofit fontScale="85000" lnSpcReduction="20000"/>
           </a:bodyPr>
           <a:lstStyle/>
           <a:p>
-            <a:endParaRPr lang="en-US" dirty="0"/>
-          </a:p>
-          <a:p>
-            <a:endParaRPr lang="en-US" dirty="0"/>
-          </a:p>
-          <a:p>
-            <a:endParaRPr lang="en-US" dirty="0"/>
-          </a:p>
-        </p:txBody>
-      </p:sp>
-      <p:sp>
-        <p:nvSpPr>
-          <p:cNvPr id="4" name="TextBox 3">
-            <a:extLst>
-              <a:ext uri="{FF2B5EF4-FFF2-40B4-BE49-F238E27FC236}">
-                <a16:creationId xmlns:a16="http://schemas.microsoft.com/office/drawing/2014/main" id="{6D97B3D3-2A54-4466-A400-EB9C6BCC333B}"/>
-              </a:ext>
-            </a:extLst>
-          </p:cNvPr>
-          <p:cNvSpPr txBox="1"/>
-          <p:nvPr/>
-        </p:nvSpPr>
-        <p:spPr>
-          <a:xfrm>
-            <a:off x="952500" y="1567543"/>
-            <a:ext cx="9312729" cy="3785652"/>
-          </a:xfrm>
-          <a:prstGeom prst="rect">
-            <a:avLst/>
-          </a:prstGeom>
-          <a:noFill/>
-        </p:spPr>
-        <p:txBody>
-          <a:bodyPr wrap="square" rtlCol="0">
-            <a:spAutoFit/>
-          </a:bodyPr>
-          <a:lstStyle/>
-          <a:p>
-            <a:pPr marL="285750" indent="-285750">
-              <a:buFont typeface="Arial" panose="020B0604020202020204" pitchFamily="34" charset="0"/>
-              <a:buChar char="•"/>
-            </a:pPr>
-            <a:r>
-              <a:rPr lang="en-US" sz="2400" dirty="0"/>
-              <a:t>From your Visual Studio Server, deploy the </a:t>
-            </a:r>
-            <a:r>
-              <a:rPr lang="en-US" sz="2400" dirty="0" err="1"/>
-              <a:t>eShoponWeb</a:t>
-            </a:r>
-            <a:r>
-              <a:rPr lang="en-US" sz="2400" dirty="0"/>
-              <a:t> application to AKS using Dev Spaces</a:t>
-            </a:r>
-          </a:p>
-          <a:p>
-            <a:pPr marL="742950" lvl="1" indent="-285750">
-              <a:buFont typeface="Arial" panose="020B0604020202020204" pitchFamily="34" charset="0"/>
-              <a:buChar char="•"/>
-            </a:pPr>
-            <a:r>
-              <a:rPr lang="en-US" sz="2400" dirty="0"/>
-              <a:t>Hint: </a:t>
-            </a:r>
-            <a:r>
-              <a:rPr lang="en-US" sz="2400" dirty="0">
+            <a:r>
+              <a:rPr lang="en-US" dirty="0"/>
+              <a:t>In Visual Studio, install the Application Insights SDK in the </a:t>
+            </a:r>
+            <a:r>
+              <a:rPr lang="en-US" dirty="0" err="1"/>
+              <a:t>eShopOnWeb</a:t>
+            </a:r>
+            <a:r>
+              <a:rPr lang="en-US" dirty="0"/>
+              <a:t> Web Project in the Solution</a:t>
+            </a:r>
+          </a:p>
+          <a:p>
+            <a:pPr lvl="1"/>
+            <a:r>
+              <a:rPr lang="en-US" dirty="0"/>
+              <a:t>Collect server-side telemetry</a:t>
+            </a:r>
+          </a:p>
+          <a:p>
+            <a:pPr lvl="2"/>
+            <a:r>
+              <a:rPr lang="en-US" sz="1900" u="sng" dirty="0">
+                <a:solidFill>
+                  <a:srgbClr val="0563C1"/>
+                </a:solidFill>
+                <a:effectLst/>
+                <a:latin typeface="Calibri" panose="020F0502020204030204" pitchFamily="34" charset="0"/>
+                <a:ea typeface="Calibri" panose="020F0502020204030204" pitchFamily="34" charset="0"/>
+                <a:cs typeface="Mangal" panose="02040503050203030202" pitchFamily="18" charset="0"/>
                 <a:hlinkClick r:id="rId2"/>
               </a:rPr>
-              <a:t>https://docs.microsoft.com/en-us/azure/dev-spaces/get-started-netcore-visualstudio</a:t>
-            </a:r>
-            <a:endParaRPr lang="en-US" sz="2400" dirty="0"/>
-          </a:p>
-          <a:p>
-            <a:pPr marL="285750" indent="-285750">
-              <a:buFont typeface="Arial" panose="020B0604020202020204" pitchFamily="34" charset="0"/>
-              <a:buChar char="•"/>
-            </a:pPr>
-            <a:r>
-              <a:rPr lang="en-US" sz="2400" dirty="0"/>
-              <a:t>From Azure Monitor, locate the container running the </a:t>
-            </a:r>
-            <a:r>
-              <a:rPr lang="en-US" sz="2400" dirty="0" err="1"/>
-              <a:t>eShoponWeb</a:t>
-            </a:r>
-            <a:r>
-              <a:rPr lang="en-US" sz="2400" dirty="0"/>
-              <a:t> application</a:t>
-            </a:r>
-          </a:p>
-          <a:p>
-            <a:pPr marL="285750" indent="-285750">
-              <a:buFont typeface="Arial" panose="020B0604020202020204" pitchFamily="34" charset="0"/>
-              <a:buChar char="•"/>
-            </a:pPr>
-            <a:r>
-              <a:rPr lang="en-US" sz="2400" dirty="0"/>
-              <a:t>Generate an exception in the </a:t>
-            </a:r>
-            <a:r>
-              <a:rPr lang="en-US" sz="2400" dirty="0" err="1"/>
-              <a:t>eShoponWeb</a:t>
-            </a:r>
-            <a:r>
-              <a:rPr lang="en-US" sz="2400" dirty="0"/>
-              <a:t> application</a:t>
-            </a:r>
-            <a:br>
-              <a:rPr lang="en-US" sz="2400" dirty="0"/>
-            </a:br>
-            <a:r>
-              <a:rPr lang="en-US" sz="2400" dirty="0"/>
-              <a:t>(Hint: Try to change your password)</a:t>
-            </a:r>
-          </a:p>
-          <a:p>
-            <a:pPr marL="285750" indent="-285750">
-              <a:buFont typeface="Arial" panose="020B0604020202020204" pitchFamily="34" charset="0"/>
-              <a:buChar char="•"/>
-            </a:pPr>
-            <a:r>
-              <a:rPr lang="en-US" sz="2400" dirty="0"/>
-              <a:t>First person to post a screenshot of the live log with the exception message wins the challenge </a:t>
-            </a:r>
+              <a:t>https://docs.microsoft.com/en-us/azure/azure-monitor/app/asp-net-core#enable-application-insights-server-side-telemetry-no-visual-studio</a:t>
+            </a:r>
+            <a:r>
+              <a:rPr lang="en-US" sz="1900" dirty="0">
+                <a:effectLst/>
+                <a:latin typeface="Calibri" panose="020F0502020204030204" pitchFamily="34" charset="0"/>
+                <a:ea typeface="Calibri" panose="020F0502020204030204" pitchFamily="34" charset="0"/>
+                <a:cs typeface="Mangal" panose="02040503050203030202" pitchFamily="18" charset="0"/>
+              </a:rPr>
+              <a:t> </a:t>
+            </a:r>
+            <a:endParaRPr lang="en-US" sz="1900" dirty="0"/>
+          </a:p>
+          <a:p>
+            <a:pPr lvl="1"/>
+            <a:r>
+              <a:rPr lang="en-US" dirty="0"/>
+              <a:t>Collect client-side page views</a:t>
+            </a:r>
+          </a:p>
+          <a:p>
+            <a:pPr lvl="2"/>
+            <a:r>
+              <a:rPr lang="en-US" sz="1900" u="sng" dirty="0">
+                <a:solidFill>
+                  <a:srgbClr val="0563C1"/>
+                </a:solidFill>
+                <a:effectLst/>
+                <a:latin typeface="Calibri" panose="020F0502020204030204" pitchFamily="34" charset="0"/>
+                <a:ea typeface="Calibri" panose="020F0502020204030204" pitchFamily="34" charset="0"/>
+                <a:cs typeface="Mangal" panose="02040503050203030202" pitchFamily="18" charset="0"/>
+                <a:hlinkClick r:id="rId3"/>
+              </a:rPr>
+              <a:t>https://docs.microsoft.com/en-us/azure/azure-monitor/app/asp-net-core#enable-client-side-telemetry-for-web-applications</a:t>
+            </a:r>
+            <a:endParaRPr lang="en-US" sz="1900" dirty="0"/>
+          </a:p>
+          <a:p>
+            <a:pPr lvl="1"/>
+            <a:r>
+              <a:rPr lang="en-US" dirty="0"/>
+              <a:t>Run the </a:t>
+            </a:r>
+            <a:r>
+              <a:rPr lang="en-US" dirty="0" err="1"/>
+              <a:t>eShopOnWeb</a:t>
+            </a:r>
+            <a:r>
+              <a:rPr lang="en-US" dirty="0"/>
+              <a:t>  Web project locally and check out the App Insights tooling in VS and the Azure Portal</a:t>
+            </a:r>
+          </a:p>
+          <a:p>
+            <a:r>
+              <a:rPr lang="en-US" dirty="0"/>
+              <a:t>Trip the exception that has been added and setup an alert for it.</a:t>
+            </a:r>
+          </a:p>
+          <a:p>
+            <a:pPr lvl="1"/>
+            <a:r>
+              <a:rPr lang="en-US" dirty="0"/>
+              <a:t>Find the exception in App Insights (Hint: Try to change your password)</a:t>
+            </a:r>
+          </a:p>
+          <a:p>
+            <a:r>
+              <a:rPr lang="en-US" dirty="0"/>
+              <a:t> Create Alerts based on availability and exceptions</a:t>
+            </a:r>
+          </a:p>
+          <a:p>
+            <a:r>
+              <a:rPr lang="en-US" dirty="0"/>
+              <a:t>First team to post screenshot with email alert of the exception wins the challenge.  Good luck</a:t>
+            </a:r>
+          </a:p>
+          <a:p>
+            <a:endParaRPr lang="en-US" dirty="0"/>
           </a:p>
         </p:txBody>
       </p:sp>
     </p:spTree>
     <p:extLst>
       <p:ext uri="{BB962C8B-B14F-4D97-AF65-F5344CB8AC3E}">
-        <p14:creationId xmlns:p14="http://schemas.microsoft.com/office/powerpoint/2010/main" val="4232406185"/>
+        <p14:creationId xmlns:p14="http://schemas.microsoft.com/office/powerpoint/2010/main" val="3119135505"/>
       </p:ext>
     </p:extLst>
   </p:cSld>
@@ -6626,7 +6699,7 @@
           <p:cNvPr id="2" name="Title 1">
             <a:extLst>
               <a:ext uri="{FF2B5EF4-FFF2-40B4-BE49-F238E27FC236}">
-                <a16:creationId xmlns:a16="http://schemas.microsoft.com/office/drawing/2014/main" id="{DF07F779-9493-43B4-B2B0-F6812A193792}"/>
+                <a16:creationId xmlns:a16="http://schemas.microsoft.com/office/drawing/2014/main" id="{9103BE6A-C3F7-45A9-AAB2-2D815440BC0A}"/>
               </a:ext>
             </a:extLst>
           </p:cNvPr>
@@ -6644,7 +6717,7 @@
           <a:p>
             <a:r>
               <a:rPr lang="en-US" dirty="0"/>
-              <a:t>Application Insights Challenges</a:t>
+              <a:t>Azure Monitor for Containers Challenge</a:t>
             </a:r>
           </a:p>
         </p:txBody>
@@ -6654,7 +6727,7 @@
           <p:cNvPr id="3" name="Content Placeholder 2">
             <a:extLst>
               <a:ext uri="{FF2B5EF4-FFF2-40B4-BE49-F238E27FC236}">
-                <a16:creationId xmlns:a16="http://schemas.microsoft.com/office/drawing/2014/main" id="{1E78601A-55E5-4C27-BA46-67A384908580}"/>
+                <a16:creationId xmlns:a16="http://schemas.microsoft.com/office/drawing/2014/main" id="{83B3D083-6DDC-4DF6-842F-2957BF37C439}"/>
               </a:ext>
             </a:extLst>
           </p:cNvPr>
@@ -6665,97 +6738,213 @@
             <p:ph idx="1"/>
           </p:nvPr>
         </p:nvSpPr>
-        <p:spPr/>
+        <p:spPr>
+          <a:xfrm>
+            <a:off x="838200" y="1506071"/>
+            <a:ext cx="10515600" cy="4670892"/>
+          </a:xfrm>
+        </p:spPr>
         <p:txBody>
           <a:bodyPr>
             <a:normAutofit/>
           </a:bodyPr>
           <a:lstStyle/>
           <a:p>
-            <a:r>
-              <a:rPr lang="en-US" dirty="0"/>
-              <a:t>In Visual Studio, Install the Application Insights SDK in the </a:t>
+            <a:endParaRPr lang="en-US" dirty="0"/>
+          </a:p>
+          <a:p>
+            <a:endParaRPr lang="en-US" dirty="0"/>
+          </a:p>
+          <a:p>
+            <a:endParaRPr lang="en-US" dirty="0"/>
+          </a:p>
+        </p:txBody>
+      </p:sp>
+      <p:sp>
+        <p:nvSpPr>
+          <p:cNvPr id="4" name="TextBox 3">
+            <a:extLst>
+              <a:ext uri="{FF2B5EF4-FFF2-40B4-BE49-F238E27FC236}">
+                <a16:creationId xmlns:a16="http://schemas.microsoft.com/office/drawing/2014/main" id="{6D97B3D3-2A54-4466-A400-EB9C6BCC333B}"/>
+              </a:ext>
+            </a:extLst>
+          </p:cNvPr>
+          <p:cNvSpPr txBox="1"/>
+          <p:nvPr/>
+        </p:nvSpPr>
+        <p:spPr>
+          <a:xfrm>
+            <a:off x="952500" y="1567543"/>
+            <a:ext cx="9312729" cy="4924425"/>
+          </a:xfrm>
+          <a:prstGeom prst="rect">
+            <a:avLst/>
+          </a:prstGeom>
+          <a:noFill/>
+        </p:spPr>
+        <p:txBody>
+          <a:bodyPr wrap="square" rtlCol="0">
+            <a:spAutoFit/>
+          </a:bodyPr>
+          <a:lstStyle/>
+          <a:p>
+            <a:pPr marL="285750" indent="-285750">
+              <a:buFont typeface="Arial" panose="020B0604020202020204" pitchFamily="34" charset="0"/>
+              <a:buChar char="•"/>
+            </a:pPr>
+            <a:r>
+              <a:rPr lang="en-US" sz="2400" dirty="0"/>
+              <a:t>From your Visual Studio Server, deploy the </a:t>
+            </a:r>
+            <a:r>
+              <a:rPr lang="en-US" sz="2400" dirty="0" err="1"/>
+              <a:t>eShoponWeb</a:t>
+            </a:r>
+            <a:r>
+              <a:rPr lang="en-US" sz="2400" dirty="0"/>
+              <a:t> application to AKS</a:t>
+            </a:r>
+          </a:p>
+          <a:p>
+            <a:pPr marL="742950" lvl="1" indent="-285750">
+              <a:buFont typeface="Arial" panose="020B0604020202020204" pitchFamily="34" charset="0"/>
+              <a:buChar char="•"/>
+            </a:pPr>
+            <a:r>
+              <a:rPr lang="en-US" dirty="0"/>
+              <a:t>Update DB connection strings to use IP addresses instead of hostnames</a:t>
+            </a:r>
+          </a:p>
+          <a:p>
+            <a:pPr marL="742950" lvl="1" indent="-285750">
+              <a:buFont typeface="Arial" panose="020B0604020202020204" pitchFamily="34" charset="0"/>
+              <a:buChar char="•"/>
+            </a:pPr>
+            <a:r>
+              <a:rPr lang="en-US" dirty="0"/>
+              <a:t>Add Docker Support to your app in VS (requires Docker Desktop to be installed)</a:t>
+            </a:r>
+          </a:p>
+          <a:p>
+            <a:pPr marL="742950" lvl="1" indent="-285750">
+              <a:buFont typeface="Arial" panose="020B0604020202020204" pitchFamily="34" charset="0"/>
+              <a:buChar char="•"/>
+            </a:pPr>
+            <a:r>
+              <a:rPr lang="en-US" dirty="0"/>
+              <a:t>Create an Azure Container Registry</a:t>
+            </a:r>
+          </a:p>
+          <a:p>
+            <a:pPr marL="742950" lvl="1" indent="-285750">
+              <a:buFont typeface="Arial" panose="020B0604020202020204" pitchFamily="34" charset="0"/>
+              <a:buChar char="•"/>
+            </a:pPr>
+            <a:r>
+              <a:rPr lang="en-US" dirty="0"/>
+              <a:t>Publish </a:t>
             </a:r>
             <a:r>
               <a:rPr lang="en-US" dirty="0" err="1"/>
-              <a:t>eShopOnWeb</a:t>
-            </a:r>
-            <a:r>
-              <a:rPr lang="en-US" dirty="0"/>
-              <a:t> Web Project in the Solution</a:t>
-            </a:r>
-          </a:p>
-          <a:p>
-            <a:pPr lvl="1"/>
-            <a:r>
-              <a:rPr lang="en-US" dirty="0"/>
-              <a:t>Run the </a:t>
-            </a:r>
-            <a:r>
-              <a:rPr lang="en-US" dirty="0" err="1"/>
-              <a:t>eShopOnWeb</a:t>
-            </a:r>
-            <a:r>
-              <a:rPr lang="en-US" dirty="0"/>
-              <a:t>  Web project and check out the App Insights tooling</a:t>
-            </a:r>
-          </a:p>
-          <a:p>
-            <a:pPr lvl="1"/>
-            <a:r>
-              <a:rPr lang="en-US" dirty="0"/>
-              <a:t>Add the updated Application Insights NuGet package to 2.12, test again</a:t>
-            </a:r>
-          </a:p>
-          <a:p>
-            <a:pPr lvl="1"/>
-            <a:r>
-              <a:rPr lang="en-US" dirty="0"/>
-              <a:t>Update the container for </a:t>
-            </a:r>
-            <a:r>
-              <a:rPr lang="en-US" dirty="0" err="1"/>
-              <a:t>eShopOnWeb</a:t>
-            </a:r>
-            <a:r>
-              <a:rPr lang="en-US" dirty="0"/>
-              <a:t> in AKS</a:t>
-            </a:r>
-          </a:p>
-          <a:p>
-            <a:r>
-              <a:rPr lang="en-US" dirty="0"/>
-              <a:t>Trip the exception that has been added and setup an alert for it.</a:t>
-            </a:r>
-          </a:p>
-          <a:p>
-            <a:pPr lvl="1"/>
-            <a:r>
-              <a:rPr lang="en-US" dirty="0"/>
-              <a:t>Find the exception in App Insights (Hint: Try to change your password)</a:t>
-            </a:r>
-          </a:p>
-          <a:p>
-            <a:r>
-              <a:rPr lang="en-US" dirty="0"/>
-              <a:t> Create Alerts based on Availability and exceptions</a:t>
-            </a:r>
-          </a:p>
-          <a:p>
-            <a:r>
-              <a:rPr lang="en-US" dirty="0"/>
-              <a:t>First team to post screenshot with email alert of the exception wins the challenge.  Good luck</a:t>
-            </a:r>
-          </a:p>
-          <a:p>
-            <a:endParaRPr lang="en-US" dirty="0"/>
+              <a:t>eshop</a:t>
+            </a:r>
+            <a:r>
+              <a:rPr lang="en-US" dirty="0"/>
+              <a:t> on web app to your Container Registry</a:t>
+            </a:r>
+          </a:p>
+          <a:p>
+            <a:pPr marL="1200150" lvl="2" indent="-285750">
+              <a:buFont typeface="Arial" panose="020B0604020202020204" pitchFamily="34" charset="0"/>
+              <a:buChar char="•"/>
+            </a:pPr>
+            <a:r>
+              <a:rPr lang="en-US" dirty="0"/>
+              <a:t>Update DB dependencies using connection strings</a:t>
+            </a:r>
+          </a:p>
+          <a:p>
+            <a:pPr marL="1200150" lvl="2" indent="-285750">
+              <a:buFont typeface="Arial" panose="020B0604020202020204" pitchFamily="34" charset="0"/>
+              <a:buChar char="•"/>
+            </a:pPr>
+            <a:r>
+              <a:rPr lang="en-US" dirty="0"/>
+              <a:t>Update App Insights dependency using instrumentation key</a:t>
+            </a:r>
+          </a:p>
+          <a:p>
+            <a:pPr marL="742950" lvl="1" indent="-285750">
+              <a:buFont typeface="Arial" panose="020B0604020202020204" pitchFamily="34" charset="0"/>
+              <a:buChar char="•"/>
+            </a:pPr>
+            <a:r>
+              <a:rPr lang="en-US" dirty="0"/>
+              <a:t>Update and use the provided deployment and service YAML files to deploy app to AKS</a:t>
+            </a:r>
+          </a:p>
+          <a:p>
+            <a:pPr marL="285750" indent="-285750">
+              <a:buFont typeface="Arial" panose="020B0604020202020204" pitchFamily="34" charset="0"/>
+              <a:buChar char="•"/>
+            </a:pPr>
+            <a:r>
+              <a:rPr lang="en-US" sz="2400" dirty="0"/>
+              <a:t>From Azure Monitor, view the CPU and memory usage of the containers running the </a:t>
+            </a:r>
+            <a:r>
+              <a:rPr lang="en-US" sz="2400" dirty="0" err="1"/>
+              <a:t>eShoponWeb</a:t>
+            </a:r>
+            <a:r>
+              <a:rPr lang="en-US" sz="2400" dirty="0"/>
+              <a:t> application</a:t>
+            </a:r>
+          </a:p>
+          <a:p>
+            <a:pPr marL="285750" indent="-285750">
+              <a:buFont typeface="Arial" panose="020B0604020202020204" pitchFamily="34" charset="0"/>
+              <a:buChar char="•"/>
+            </a:pPr>
+            <a:r>
+              <a:rPr lang="en-US" sz="2400" dirty="0"/>
+              <a:t>Generate and view an exception in the </a:t>
+            </a:r>
+            <a:r>
+              <a:rPr lang="en-US" sz="2400" dirty="0" err="1"/>
+              <a:t>eShoponWeb</a:t>
+            </a:r>
+            <a:r>
+              <a:rPr lang="en-US" sz="2400" dirty="0"/>
+              <a:t> application </a:t>
+            </a:r>
+          </a:p>
+          <a:p>
+            <a:pPr marL="742950" lvl="1" indent="-285750">
+              <a:buFont typeface="Arial" panose="020B0604020202020204" pitchFamily="34" charset="0"/>
+              <a:buChar char="•"/>
+            </a:pPr>
+            <a:r>
+              <a:rPr lang="en-US" sz="2000" dirty="0"/>
+              <a:t>Hint: Try to change your password	</a:t>
+            </a:r>
+          </a:p>
+          <a:p>
+            <a:pPr marL="285750" indent="-285750">
+              <a:buFont typeface="Arial" panose="020B0604020202020204" pitchFamily="34" charset="0"/>
+              <a:buChar char="•"/>
+            </a:pPr>
+            <a:r>
+              <a:rPr lang="en-US" sz="2400" dirty="0"/>
+              <a:t>First person to post a screenshot of the live log with the exception message wins the challenge </a:t>
+            </a:r>
           </a:p>
         </p:txBody>
       </p:sp>
     </p:spTree>
     <p:extLst>
       <p:ext uri="{BB962C8B-B14F-4D97-AF65-F5344CB8AC3E}">
-        <p14:creationId xmlns:p14="http://schemas.microsoft.com/office/powerpoint/2010/main" val="3119135505"/>
+        <p14:creationId xmlns:p14="http://schemas.microsoft.com/office/powerpoint/2010/main" val="4232406185"/>
       </p:ext>
     </p:extLst>
   </p:cSld>

</xml_diff>